<commit_message>
created files for orders
</commit_message>
<xml_diff>
--- a/Jira screenshots.pptx
+++ b/Jira screenshots.pptx
@@ -8,6 +8,7 @@
     <p:sldId id="256" r:id="rId2"/>
     <p:sldId id="257" r:id="rId3"/>
     <p:sldId id="258" r:id="rId4"/>
+    <p:sldId id="259" r:id="rId5"/>
   </p:sldIdLst>
   <p:sldSz cx="12192000" cy="6858000"/>
   <p:notesSz cx="6858000" cy="9144000"/>
@@ -106,6 +107,11 @@
       </a:defRPr>
     </a:lvl9pPr>
   </p:defaultTextStyle>
+  <p:extLst>
+    <p:ext uri="{EFAFB233-063F-42B5-8137-9DF3F51BA10A}">
+      <p15:sldGuideLst xmlns:p15="http://schemas.microsoft.com/office/powerpoint/2012/main"/>
+    </p:ext>
+  </p:extLst>
 </p:presentation>
 </file>
 
@@ -3654,6 +3660,115 @@
 </p:sld>
 </file>
 
+<file path=ppt/slides/slide4.xml><?xml version="1.0" encoding="utf-8"?>
+<p:sld xmlns:a="http://schemas.openxmlformats.org/drawingml/2006/main" xmlns:r="http://schemas.openxmlformats.org/officeDocument/2006/relationships" xmlns:p="http://schemas.openxmlformats.org/presentationml/2006/main">
+  <p:cSld>
+    <p:spTree>
+      <p:nvGrpSpPr>
+        <p:cNvPr id="1" name=""/>
+        <p:cNvGrpSpPr/>
+        <p:nvPr/>
+      </p:nvGrpSpPr>
+      <p:grpSpPr>
+        <a:xfrm>
+          <a:off x="0" y="0"/>
+          <a:ext cx="0" cy="0"/>
+          <a:chOff x="0" y="0"/>
+          <a:chExt cx="0" cy="0"/>
+        </a:xfrm>
+      </p:grpSpPr>
+      <p:sp>
+        <p:nvSpPr>
+          <p:cNvPr id="2" name="Title 1">
+            <a:extLst>
+              <a:ext uri="{FF2B5EF4-FFF2-40B4-BE49-F238E27FC236}">
+                <a16:creationId xmlns:a16="http://schemas.microsoft.com/office/drawing/2014/main" id="{B505E7A6-590D-4CAB-B4B5-B8136E1E051F}"/>
+              </a:ext>
+            </a:extLst>
+          </p:cNvPr>
+          <p:cNvSpPr>
+            <a:spLocks noGrp="1"/>
+          </p:cNvSpPr>
+          <p:nvPr>
+            <p:ph type="title"/>
+          </p:nvPr>
+        </p:nvSpPr>
+        <p:spPr/>
+        <p:txBody>
+          <a:bodyPr/>
+          <a:lstStyle/>
+          <a:p>
+            <a:endParaRPr lang="en-GB"/>
+          </a:p>
+        </p:txBody>
+      </p:sp>
+      <p:sp>
+        <p:nvSpPr>
+          <p:cNvPr id="3" name="Content Placeholder 2">
+            <a:extLst>
+              <a:ext uri="{FF2B5EF4-FFF2-40B4-BE49-F238E27FC236}">
+                <a16:creationId xmlns:a16="http://schemas.microsoft.com/office/drawing/2014/main" id="{2BAE05FD-B897-4F07-8E11-23620E272C19}"/>
+              </a:ext>
+            </a:extLst>
+          </p:cNvPr>
+          <p:cNvSpPr>
+            <a:spLocks noGrp="1"/>
+          </p:cNvSpPr>
+          <p:nvPr>
+            <p:ph idx="1"/>
+          </p:nvPr>
+        </p:nvSpPr>
+        <p:spPr/>
+        <p:txBody>
+          <a:bodyPr/>
+          <a:lstStyle/>
+          <a:p>
+            <a:endParaRPr lang="en-GB"/>
+          </a:p>
+        </p:txBody>
+      </p:sp>
+      <p:pic>
+        <p:nvPicPr>
+          <p:cNvPr id="5" name="Picture 4">
+            <a:extLst>
+              <a:ext uri="{FF2B5EF4-FFF2-40B4-BE49-F238E27FC236}">
+                <a16:creationId xmlns:a16="http://schemas.microsoft.com/office/drawing/2014/main" id="{983B523C-54B9-44A6-BDEE-DF7DA11B5003}"/>
+              </a:ext>
+            </a:extLst>
+          </p:cNvPr>
+          <p:cNvPicPr>
+            <a:picLocks noChangeAspect="1"/>
+          </p:cNvPicPr>
+          <p:nvPr/>
+        </p:nvPicPr>
+        <p:blipFill rotWithShape="1">
+          <a:blip r:embed="rId2"/>
+          <a:srcRect l="17344" t="20278" r="1016" b="5324"/>
+          <a:stretch/>
+        </p:blipFill>
+        <p:spPr>
+          <a:xfrm>
+            <a:off x="495300" y="374650"/>
+            <a:ext cx="10975621" cy="5626100"/>
+          </a:xfrm>
+          <a:prstGeom prst="rect">
+            <a:avLst/>
+          </a:prstGeom>
+        </p:spPr>
+      </p:pic>
+    </p:spTree>
+    <p:extLst>
+      <p:ext uri="{BB962C8B-B14F-4D97-AF65-F5344CB8AC3E}">
+        <p14:creationId xmlns:p14="http://schemas.microsoft.com/office/powerpoint/2010/main" val="607171967"/>
+      </p:ext>
+    </p:extLst>
+  </p:cSld>
+  <p:clrMapOvr>
+    <a:masterClrMapping/>
+  </p:clrMapOvr>
+</p:sld>
+</file>
+
 <file path=ppt/theme/theme1.xml><?xml version="1.0" encoding="utf-8"?>
 <a:theme xmlns:a="http://schemas.openxmlformats.org/drawingml/2006/main" name="Office Theme">
   <a:themeElements>

</xml_diff>

<commit_message>
updated all delete statements
</commit_message>
<xml_diff>
--- a/Jira screenshots.pptx
+++ b/Jira screenshots.pptx
@@ -9,6 +9,7 @@
     <p:sldId id="257" r:id="rId3"/>
     <p:sldId id="258" r:id="rId4"/>
     <p:sldId id="259" r:id="rId5"/>
+    <p:sldId id="260" r:id="rId6"/>
   </p:sldIdLst>
   <p:sldSz cx="12192000" cy="6858000"/>
   <p:notesSz cx="6858000" cy="9144000"/>
@@ -264,7 +265,7 @@
           <a:p>
             <a:fld id="{D6B18971-7280-423D-AADF-0067B5392623}" type="datetimeFigureOut">
               <a:rPr lang="en-GB" smtClean="0"/>
-              <a:t>10/07/2020</a:t>
+              <a:t>14/07/2020</a:t>
             </a:fld>
             <a:endParaRPr lang="en-GB"/>
           </a:p>
@@ -464,7 +465,7 @@
           <a:p>
             <a:fld id="{D6B18971-7280-423D-AADF-0067B5392623}" type="datetimeFigureOut">
               <a:rPr lang="en-GB" smtClean="0"/>
-              <a:t>10/07/2020</a:t>
+              <a:t>14/07/2020</a:t>
             </a:fld>
             <a:endParaRPr lang="en-GB"/>
           </a:p>
@@ -674,7 +675,7 @@
           <a:p>
             <a:fld id="{D6B18971-7280-423D-AADF-0067B5392623}" type="datetimeFigureOut">
               <a:rPr lang="en-GB" smtClean="0"/>
-              <a:t>10/07/2020</a:t>
+              <a:t>14/07/2020</a:t>
             </a:fld>
             <a:endParaRPr lang="en-GB"/>
           </a:p>
@@ -874,7 +875,7 @@
           <a:p>
             <a:fld id="{D6B18971-7280-423D-AADF-0067B5392623}" type="datetimeFigureOut">
               <a:rPr lang="en-GB" smtClean="0"/>
-              <a:t>10/07/2020</a:t>
+              <a:t>14/07/2020</a:t>
             </a:fld>
             <a:endParaRPr lang="en-GB"/>
           </a:p>
@@ -1150,7 +1151,7 @@
           <a:p>
             <a:fld id="{D6B18971-7280-423D-AADF-0067B5392623}" type="datetimeFigureOut">
               <a:rPr lang="en-GB" smtClean="0"/>
-              <a:t>10/07/2020</a:t>
+              <a:t>14/07/2020</a:t>
             </a:fld>
             <a:endParaRPr lang="en-GB"/>
           </a:p>
@@ -1418,7 +1419,7 @@
           <a:p>
             <a:fld id="{D6B18971-7280-423D-AADF-0067B5392623}" type="datetimeFigureOut">
               <a:rPr lang="en-GB" smtClean="0"/>
-              <a:t>10/07/2020</a:t>
+              <a:t>14/07/2020</a:t>
             </a:fld>
             <a:endParaRPr lang="en-GB"/>
           </a:p>
@@ -1833,7 +1834,7 @@
           <a:p>
             <a:fld id="{D6B18971-7280-423D-AADF-0067B5392623}" type="datetimeFigureOut">
               <a:rPr lang="en-GB" smtClean="0"/>
-              <a:t>10/07/2020</a:t>
+              <a:t>14/07/2020</a:t>
             </a:fld>
             <a:endParaRPr lang="en-GB"/>
           </a:p>
@@ -1975,7 +1976,7 @@
           <a:p>
             <a:fld id="{D6B18971-7280-423D-AADF-0067B5392623}" type="datetimeFigureOut">
               <a:rPr lang="en-GB" smtClean="0"/>
-              <a:t>10/07/2020</a:t>
+              <a:t>14/07/2020</a:t>
             </a:fld>
             <a:endParaRPr lang="en-GB"/>
           </a:p>
@@ -2088,7 +2089,7 @@
           <a:p>
             <a:fld id="{D6B18971-7280-423D-AADF-0067B5392623}" type="datetimeFigureOut">
               <a:rPr lang="en-GB" smtClean="0"/>
-              <a:t>10/07/2020</a:t>
+              <a:t>14/07/2020</a:t>
             </a:fld>
             <a:endParaRPr lang="en-GB"/>
           </a:p>
@@ -2401,7 +2402,7 @@
           <a:p>
             <a:fld id="{D6B18971-7280-423D-AADF-0067B5392623}" type="datetimeFigureOut">
               <a:rPr lang="en-GB" smtClean="0"/>
-              <a:t>10/07/2020</a:t>
+              <a:t>14/07/2020</a:t>
             </a:fld>
             <a:endParaRPr lang="en-GB"/>
           </a:p>
@@ -2690,7 +2691,7 @@
           <a:p>
             <a:fld id="{D6B18971-7280-423D-AADF-0067B5392623}" type="datetimeFigureOut">
               <a:rPr lang="en-GB" smtClean="0"/>
-              <a:t>10/07/2020</a:t>
+              <a:t>14/07/2020</a:t>
             </a:fld>
             <a:endParaRPr lang="en-GB"/>
           </a:p>
@@ -2933,7 +2934,7 @@
           <a:p>
             <a:fld id="{D6B18971-7280-423D-AADF-0067B5392623}" type="datetimeFigureOut">
               <a:rPr lang="en-GB" smtClean="0"/>
-              <a:t>10/07/2020</a:t>
+              <a:t>14/07/2020</a:t>
             </a:fld>
             <a:endParaRPr lang="en-GB"/>
           </a:p>
@@ -3769,6 +3770,115 @@
 </p:sld>
 </file>
 
+<file path=ppt/slides/slide5.xml><?xml version="1.0" encoding="utf-8"?>
+<p:sld xmlns:a="http://schemas.openxmlformats.org/drawingml/2006/main" xmlns:r="http://schemas.openxmlformats.org/officeDocument/2006/relationships" xmlns:p="http://schemas.openxmlformats.org/presentationml/2006/main">
+  <p:cSld>
+    <p:spTree>
+      <p:nvGrpSpPr>
+        <p:cNvPr id="1" name=""/>
+        <p:cNvGrpSpPr/>
+        <p:nvPr/>
+      </p:nvGrpSpPr>
+      <p:grpSpPr>
+        <a:xfrm>
+          <a:off x="0" y="0"/>
+          <a:ext cx="0" cy="0"/>
+          <a:chOff x="0" y="0"/>
+          <a:chExt cx="0" cy="0"/>
+        </a:xfrm>
+      </p:grpSpPr>
+      <p:sp>
+        <p:nvSpPr>
+          <p:cNvPr id="2" name="Title 1">
+            <a:extLst>
+              <a:ext uri="{FF2B5EF4-FFF2-40B4-BE49-F238E27FC236}">
+                <a16:creationId xmlns:a16="http://schemas.microsoft.com/office/drawing/2014/main" id="{8962C871-FDC1-4586-8DDC-16639D12130D}"/>
+              </a:ext>
+            </a:extLst>
+          </p:cNvPr>
+          <p:cNvSpPr>
+            <a:spLocks noGrp="1"/>
+          </p:cNvSpPr>
+          <p:nvPr>
+            <p:ph type="title"/>
+          </p:nvPr>
+        </p:nvSpPr>
+        <p:spPr/>
+        <p:txBody>
+          <a:bodyPr/>
+          <a:lstStyle/>
+          <a:p>
+            <a:endParaRPr lang="en-GB"/>
+          </a:p>
+        </p:txBody>
+      </p:sp>
+      <p:sp>
+        <p:nvSpPr>
+          <p:cNvPr id="3" name="Content Placeholder 2">
+            <a:extLst>
+              <a:ext uri="{FF2B5EF4-FFF2-40B4-BE49-F238E27FC236}">
+                <a16:creationId xmlns:a16="http://schemas.microsoft.com/office/drawing/2014/main" id="{A6BE4F71-A98D-44F8-B10B-9CE855CEDFB5}"/>
+              </a:ext>
+            </a:extLst>
+          </p:cNvPr>
+          <p:cNvSpPr>
+            <a:spLocks noGrp="1"/>
+          </p:cNvSpPr>
+          <p:nvPr>
+            <p:ph idx="1"/>
+          </p:nvPr>
+        </p:nvSpPr>
+        <p:spPr/>
+        <p:txBody>
+          <a:bodyPr/>
+          <a:lstStyle/>
+          <a:p>
+            <a:endParaRPr lang="en-GB"/>
+          </a:p>
+        </p:txBody>
+      </p:sp>
+      <p:pic>
+        <p:nvPicPr>
+          <p:cNvPr id="5" name="Picture 4">
+            <a:extLst>
+              <a:ext uri="{FF2B5EF4-FFF2-40B4-BE49-F238E27FC236}">
+                <a16:creationId xmlns:a16="http://schemas.microsoft.com/office/drawing/2014/main" id="{EE1205B6-583D-4CD1-8D73-3A6B86CB6466}"/>
+              </a:ext>
+            </a:extLst>
+          </p:cNvPr>
+          <p:cNvPicPr>
+            <a:picLocks noChangeAspect="1"/>
+          </p:cNvPicPr>
+          <p:nvPr/>
+        </p:nvPicPr>
+        <p:blipFill rotWithShape="1">
+          <a:blip r:embed="rId2"/>
+          <a:srcRect l="14609" t="39028" r="1875" b="4028"/>
+          <a:stretch/>
+        </p:blipFill>
+        <p:spPr>
+          <a:xfrm>
+            <a:off x="1781174" y="2676524"/>
+            <a:ext cx="10182225" cy="3905251"/>
+          </a:xfrm>
+          <a:prstGeom prst="rect">
+            <a:avLst/>
+          </a:prstGeom>
+        </p:spPr>
+      </p:pic>
+    </p:spTree>
+    <p:extLst>
+      <p:ext uri="{BB962C8B-B14F-4D97-AF65-F5344CB8AC3E}">
+        <p14:creationId xmlns:p14="http://schemas.microsoft.com/office/powerpoint/2010/main" val="1020470797"/>
+      </p:ext>
+    </p:extLst>
+  </p:cSld>
+  <p:clrMapOvr>
+    <a:masterClrMapping/>
+  </p:clrMapOvr>
+</p:sld>
+</file>
+
 <file path=ppt/theme/theme1.xml><?xml version="1.0" encoding="utf-8"?>
 <a:theme xmlns:a="http://schemas.openxmlformats.org/drawingml/2006/main" name="Office Theme">
   <a:themeElements>

</xml_diff>

<commit_message>
finished tests for order controller and services
</commit_message>
<xml_diff>
--- a/Jira screenshots.pptx
+++ b/Jira screenshots.pptx
@@ -10,6 +10,7 @@
     <p:sldId id="258" r:id="rId4"/>
     <p:sldId id="259" r:id="rId5"/>
     <p:sldId id="260" r:id="rId6"/>
+    <p:sldId id="261" r:id="rId7"/>
   </p:sldIdLst>
   <p:sldSz cx="12192000" cy="6858000"/>
   <p:notesSz cx="6858000" cy="9144000"/>
@@ -265,7 +266,7 @@
           <a:p>
             <a:fld id="{D6B18971-7280-423D-AADF-0067B5392623}" type="datetimeFigureOut">
               <a:rPr lang="en-GB" smtClean="0"/>
-              <a:t>14/07/2020</a:t>
+              <a:t>15/07/2020</a:t>
             </a:fld>
             <a:endParaRPr lang="en-GB"/>
           </a:p>
@@ -465,7 +466,7 @@
           <a:p>
             <a:fld id="{D6B18971-7280-423D-AADF-0067B5392623}" type="datetimeFigureOut">
               <a:rPr lang="en-GB" smtClean="0"/>
-              <a:t>14/07/2020</a:t>
+              <a:t>15/07/2020</a:t>
             </a:fld>
             <a:endParaRPr lang="en-GB"/>
           </a:p>
@@ -675,7 +676,7 @@
           <a:p>
             <a:fld id="{D6B18971-7280-423D-AADF-0067B5392623}" type="datetimeFigureOut">
               <a:rPr lang="en-GB" smtClean="0"/>
-              <a:t>14/07/2020</a:t>
+              <a:t>15/07/2020</a:t>
             </a:fld>
             <a:endParaRPr lang="en-GB"/>
           </a:p>
@@ -875,7 +876,7 @@
           <a:p>
             <a:fld id="{D6B18971-7280-423D-AADF-0067B5392623}" type="datetimeFigureOut">
               <a:rPr lang="en-GB" smtClean="0"/>
-              <a:t>14/07/2020</a:t>
+              <a:t>15/07/2020</a:t>
             </a:fld>
             <a:endParaRPr lang="en-GB"/>
           </a:p>
@@ -1151,7 +1152,7 @@
           <a:p>
             <a:fld id="{D6B18971-7280-423D-AADF-0067B5392623}" type="datetimeFigureOut">
               <a:rPr lang="en-GB" smtClean="0"/>
-              <a:t>14/07/2020</a:t>
+              <a:t>15/07/2020</a:t>
             </a:fld>
             <a:endParaRPr lang="en-GB"/>
           </a:p>
@@ -1419,7 +1420,7 @@
           <a:p>
             <a:fld id="{D6B18971-7280-423D-AADF-0067B5392623}" type="datetimeFigureOut">
               <a:rPr lang="en-GB" smtClean="0"/>
-              <a:t>14/07/2020</a:t>
+              <a:t>15/07/2020</a:t>
             </a:fld>
             <a:endParaRPr lang="en-GB"/>
           </a:p>
@@ -1834,7 +1835,7 @@
           <a:p>
             <a:fld id="{D6B18971-7280-423D-AADF-0067B5392623}" type="datetimeFigureOut">
               <a:rPr lang="en-GB" smtClean="0"/>
-              <a:t>14/07/2020</a:t>
+              <a:t>15/07/2020</a:t>
             </a:fld>
             <a:endParaRPr lang="en-GB"/>
           </a:p>
@@ -1976,7 +1977,7 @@
           <a:p>
             <a:fld id="{D6B18971-7280-423D-AADF-0067B5392623}" type="datetimeFigureOut">
               <a:rPr lang="en-GB" smtClean="0"/>
-              <a:t>14/07/2020</a:t>
+              <a:t>15/07/2020</a:t>
             </a:fld>
             <a:endParaRPr lang="en-GB"/>
           </a:p>
@@ -2089,7 +2090,7 @@
           <a:p>
             <a:fld id="{D6B18971-7280-423D-AADF-0067B5392623}" type="datetimeFigureOut">
               <a:rPr lang="en-GB" smtClean="0"/>
-              <a:t>14/07/2020</a:t>
+              <a:t>15/07/2020</a:t>
             </a:fld>
             <a:endParaRPr lang="en-GB"/>
           </a:p>
@@ -2402,7 +2403,7 @@
           <a:p>
             <a:fld id="{D6B18971-7280-423D-AADF-0067B5392623}" type="datetimeFigureOut">
               <a:rPr lang="en-GB" smtClean="0"/>
-              <a:t>14/07/2020</a:t>
+              <a:t>15/07/2020</a:t>
             </a:fld>
             <a:endParaRPr lang="en-GB"/>
           </a:p>
@@ -2691,7 +2692,7 @@
           <a:p>
             <a:fld id="{D6B18971-7280-423D-AADF-0067B5392623}" type="datetimeFigureOut">
               <a:rPr lang="en-GB" smtClean="0"/>
-              <a:t>14/07/2020</a:t>
+              <a:t>15/07/2020</a:t>
             </a:fld>
             <a:endParaRPr lang="en-GB"/>
           </a:p>
@@ -2934,7 +2935,7 @@
           <a:p>
             <a:fld id="{D6B18971-7280-423D-AADF-0067B5392623}" type="datetimeFigureOut">
               <a:rPr lang="en-GB" smtClean="0"/>
-              <a:t>14/07/2020</a:t>
+              <a:t>15/07/2020</a:t>
             </a:fld>
             <a:endParaRPr lang="en-GB"/>
           </a:p>
@@ -3879,6 +3880,65 @@
 </p:sld>
 </file>
 
+<file path=ppt/slides/slide6.xml><?xml version="1.0" encoding="utf-8"?>
+<p:sld xmlns:a="http://schemas.openxmlformats.org/drawingml/2006/main" xmlns:r="http://schemas.openxmlformats.org/officeDocument/2006/relationships" xmlns:p="http://schemas.openxmlformats.org/presentationml/2006/main">
+  <p:cSld>
+    <p:spTree>
+      <p:nvGrpSpPr>
+        <p:cNvPr id="1" name=""/>
+        <p:cNvGrpSpPr/>
+        <p:nvPr/>
+      </p:nvGrpSpPr>
+      <p:grpSpPr>
+        <a:xfrm>
+          <a:off x="0" y="0"/>
+          <a:ext cx="0" cy="0"/>
+          <a:chOff x="0" y="0"/>
+          <a:chExt cx="0" cy="0"/>
+        </a:xfrm>
+      </p:grpSpPr>
+      <p:pic>
+        <p:nvPicPr>
+          <p:cNvPr id="5" name="Picture 4">
+            <a:extLst>
+              <a:ext uri="{FF2B5EF4-FFF2-40B4-BE49-F238E27FC236}">
+                <a16:creationId xmlns:a16="http://schemas.microsoft.com/office/drawing/2014/main" id="{1CCCDC74-8098-40B0-A978-96B0CB1EC777}"/>
+              </a:ext>
+            </a:extLst>
+          </p:cNvPr>
+          <p:cNvPicPr>
+            <a:picLocks noChangeAspect="1"/>
+          </p:cNvPicPr>
+          <p:nvPr/>
+        </p:nvPicPr>
+        <p:blipFill rotWithShape="1">
+          <a:blip r:embed="rId2"/>
+          <a:srcRect l="18047" t="39306" r="5625" b="9930"/>
+          <a:stretch/>
+        </p:blipFill>
+        <p:spPr>
+          <a:xfrm>
+            <a:off x="0" y="1174352"/>
+            <a:ext cx="12053569" cy="4509295"/>
+          </a:xfrm>
+          <a:prstGeom prst="rect">
+            <a:avLst/>
+          </a:prstGeom>
+        </p:spPr>
+      </p:pic>
+    </p:spTree>
+    <p:extLst>
+      <p:ext uri="{BB962C8B-B14F-4D97-AF65-F5344CB8AC3E}">
+        <p14:creationId xmlns:p14="http://schemas.microsoft.com/office/powerpoint/2010/main" val="4149301332"/>
+      </p:ext>
+    </p:extLst>
+  </p:cSld>
+  <p:clrMapOvr>
+    <a:masterClrMapping/>
+  </p:clrMapOvr>
+</p:sld>
+</file>
+
 <file path=ppt/theme/theme1.xml><?xml version="1.0" encoding="utf-8"?>
 <a:theme xmlns:a="http://schemas.openxmlformats.org/drawingml/2006/main" name="Office Theme">
   <a:themeElements>

</xml_diff>